<commit_message>
docs: Change a bar chart title
</commit_message>
<xml_diff>
--- a/Data Analytics - Task 3_final.pptx
+++ b/Data Analytics - Task 3_final.pptx
@@ -10754,153 +10754,6 @@
           </a:prstGeom>
         </p:spPr>
       </p:pic>
-      <p:sp>
-        <p:nvSpPr>
-          <p:cNvPr id="6" name="TextBox 6"/>
-          <p:cNvSpPr txBox="1"/>
-          <p:nvPr/>
-        </p:nvSpPr>
-        <p:spPr>
-          <a:xfrm>
-            <a:off x="381000" y="1186815"/>
-            <a:ext cx="11125200" cy="7386320"/>
-          </a:xfrm>
-          <a:prstGeom prst="rect">
-            <a:avLst/>
-          </a:prstGeom>
-        </p:spPr>
-        <p:txBody>
-          <a:bodyPr wrap="square" lIns="0" tIns="0" rIns="0" bIns="0" rtlCol="0" anchor="t">
-            <a:spAutoFit/>
-          </a:bodyPr>
-          <a:lstStyle/>
-          <a:p>
-            <a:pPr>
-              <a:lnSpc>
-                <a:spcPts val="9600"/>
-              </a:lnSpc>
-            </a:pPr>
-            <a:r>
-              <a:rPr lang="en-US" sz="8000" spc="-80" dirty="0">
-                <a:solidFill>
-                  <a:schemeClr val="accent1"/>
-                </a:solidFill>
-                <a:latin typeface="Graphik Regular" panose="020B0503030202060203" pitchFamily="34" charset="0"/>
-              </a:rPr>
-              <a:t>Summary</a:t>
-            </a:r>
-            <a:endParaRPr lang="en-US" sz="8000" spc="-80" dirty="0">
-              <a:solidFill>
-                <a:srgbClr val="000000"/>
-              </a:solidFill>
-              <a:latin typeface="Graphik Regular" panose="020B0503030202060203" pitchFamily="34" charset="0"/>
-            </a:endParaRPr>
-          </a:p>
-          <a:p>
-            <a:pPr>
-              <a:lnSpc>
-                <a:spcPts val="9600"/>
-              </a:lnSpc>
-            </a:pPr>
-            <a:r>
-              <a:rPr lang="en-US" sz="8000" spc="-80" dirty="0">
-                <a:solidFill>
-                  <a:srgbClr val="000000"/>
-                </a:solidFill>
-                <a:latin typeface="Graphik Regular" panose="020B0503030202060203" pitchFamily="34" charset="0"/>
-              </a:rPr>
-              <a:t>The top 5 most popular content categories are: </a:t>
-            </a:r>
-            <a:r>
-              <a:rPr lang="en-US" sz="8000" spc="-80" dirty="0">
-                <a:solidFill>
-                  <a:srgbClr val="A100FF"/>
-                </a:solidFill>
-                <a:latin typeface="Graphik Regular" panose="020B0503030202060203" pitchFamily="34" charset="0"/>
-              </a:rPr>
-              <a:t>animals</a:t>
-            </a:r>
-            <a:r>
-              <a:rPr lang="en-US" sz="8000" spc="-80" dirty="0">
-                <a:solidFill>
-                  <a:srgbClr val="000000"/>
-                </a:solidFill>
-                <a:latin typeface="Graphik Regular" panose="020B0503030202060203" pitchFamily="34" charset="0"/>
-              </a:rPr>
-              <a:t>, </a:t>
-            </a:r>
-            <a:r>
-              <a:rPr lang="en-US" sz="8000" spc="-80" dirty="0">
-                <a:solidFill>
-                  <a:srgbClr val="A100FF"/>
-                </a:solidFill>
-                <a:latin typeface="Graphik Regular" panose="020B0503030202060203" pitchFamily="34" charset="0"/>
-              </a:rPr>
-              <a:t>science</a:t>
-            </a:r>
-            <a:r>
-              <a:rPr lang="en-US" sz="8000" spc="-80" dirty="0">
-                <a:solidFill>
-                  <a:srgbClr val="000000"/>
-                </a:solidFill>
-                <a:latin typeface="Graphik Regular" panose="020B0503030202060203" pitchFamily="34" charset="0"/>
-              </a:rPr>
-              <a:t>, </a:t>
-            </a:r>
-            <a:r>
-              <a:rPr lang="en-US" sz="8000" spc="-80" dirty="0">
-                <a:solidFill>
-                  <a:srgbClr val="A100FF"/>
-                </a:solidFill>
-                <a:latin typeface="Graphik Regular" panose="020B0503030202060203" pitchFamily="34" charset="0"/>
-              </a:rPr>
-              <a:t>healthy eating</a:t>
-            </a:r>
-            <a:r>
-              <a:rPr lang="en-US" sz="8000" spc="-80" dirty="0">
-                <a:solidFill>
-                  <a:srgbClr val="000000"/>
-                </a:solidFill>
-                <a:latin typeface="Graphik Regular" panose="020B0503030202060203" pitchFamily="34" charset="0"/>
-              </a:rPr>
-              <a:t>, </a:t>
-            </a:r>
-            <a:r>
-              <a:rPr lang="en-US" sz="8000" spc="-80" dirty="0">
-                <a:solidFill>
-                  <a:srgbClr val="A100FF"/>
-                </a:solidFill>
-                <a:latin typeface="Graphik Regular" panose="020B0503030202060203" pitchFamily="34" charset="0"/>
-              </a:rPr>
-              <a:t>technology</a:t>
-            </a:r>
-            <a:r>
-              <a:rPr lang="en-US" sz="8000" spc="-80" dirty="0">
-                <a:solidFill>
-                  <a:srgbClr val="000000"/>
-                </a:solidFill>
-                <a:latin typeface="Graphik Regular" panose="020B0503030202060203" pitchFamily="34" charset="0"/>
-              </a:rPr>
-              <a:t>, and </a:t>
-            </a:r>
-            <a:r>
-              <a:rPr lang="en-US" sz="8000" spc="-80" dirty="0">
-                <a:solidFill>
-                  <a:srgbClr val="A100FF"/>
-                </a:solidFill>
-                <a:latin typeface="Graphik Regular" panose="020B0503030202060203" pitchFamily="34" charset="0"/>
-              </a:rPr>
-              <a:t>food</a:t>
-            </a:r>
-            <a:endParaRPr lang="en-US" sz="8000" spc="-80" dirty="0">
-              <a:solidFill>
-                <a:srgbClr val="A100FF"/>
-              </a:solidFill>
-              <a:latin typeface="Graphik Regular" panose="020B0503030202060203" pitchFamily="34" charset="0"/>
-            </a:endParaRPr>
-          </a:p>
-        </p:txBody>
-      </p:sp>
       <p:grpSp>
         <p:nvGrpSpPr>
           <p:cNvPr id="7" name="Group 7"/>
@@ -11381,6 +11234,30 @@
           </p:txBody>
         </p:sp>
       </p:grpSp>
+      <p:pic>
+        <p:nvPicPr>
+          <p:cNvPr id="2" name="Picture 1" descr="download (1)"/>
+          <p:cNvPicPr>
+            <a:picLocks noChangeAspect="1"/>
+          </p:cNvPicPr>
+          <p:nvPr/>
+        </p:nvPicPr>
+        <p:blipFill>
+          <a:blip r:embed="rId4"/>
+          <a:stretch>
+            <a:fillRect/>
+          </a:stretch>
+        </p:blipFill>
+        <p:spPr>
+          <a:xfrm>
+            <a:off x="609600" y="571500"/>
+            <a:ext cx="10824210" cy="8324850"/>
+          </a:xfrm>
+          <a:prstGeom prst="rect">
+            <a:avLst/>
+          </a:prstGeom>
+        </p:spPr>
+      </p:pic>
     </p:spTree>
   </p:cSld>
   <p:clrMapOvr>

</xml_diff>